<commit_message>
updated ppt with slide 14
</commit_message>
<xml_diff>
--- a/Loan approval project 3.pptx
+++ b/Loan approval project 3.pptx
@@ -18,7 +18,8 @@
     <p:sldId id="278" r:id="rId12"/>
     <p:sldId id="277" r:id="rId13"/>
     <p:sldId id="270" r:id="rId14"/>
-    <p:sldId id="269" r:id="rId15"/>
+    <p:sldId id="280" r:id="rId15"/>
+    <p:sldId id="269" r:id="rId16"/>
   </p:sldIdLst>
   <p:sldSz cx="12192000" cy="6858000"/>
   <p:notesSz cx="6858000" cy="9144000"/>
@@ -272,7 +273,7 @@
           <a:p>
             <a:fld id="{F0037C11-A992-43DC-841C-4ED15B44942C}" type="datetimeFigureOut">
               <a:rPr lang="en-US" smtClean="0"/>
-              <a:t>2/23/2021</a:t>
+              <a:t>2/24/2021</a:t>
             </a:fld>
             <a:endParaRPr lang="en-US" dirty="0"/>
           </a:p>
@@ -470,7 +471,7 @@
           <a:p>
             <a:fld id="{F0037C11-A992-43DC-841C-4ED15B44942C}" type="datetimeFigureOut">
               <a:rPr lang="en-US" smtClean="0"/>
-              <a:t>2/23/2021</a:t>
+              <a:t>2/24/2021</a:t>
             </a:fld>
             <a:endParaRPr lang="en-US" dirty="0"/>
           </a:p>
@@ -678,7 +679,7 @@
           <a:p>
             <a:fld id="{F0037C11-A992-43DC-841C-4ED15B44942C}" type="datetimeFigureOut">
               <a:rPr lang="en-US" smtClean="0"/>
-              <a:t>2/23/2021</a:t>
+              <a:t>2/24/2021</a:t>
             </a:fld>
             <a:endParaRPr lang="en-US" dirty="0"/>
           </a:p>
@@ -876,7 +877,7 @@
           <a:p>
             <a:fld id="{F0037C11-A992-43DC-841C-4ED15B44942C}" type="datetimeFigureOut">
               <a:rPr lang="en-US" smtClean="0"/>
-              <a:t>2/23/2021</a:t>
+              <a:t>2/24/2021</a:t>
             </a:fld>
             <a:endParaRPr lang="en-US" dirty="0"/>
           </a:p>
@@ -1151,7 +1152,7 @@
           <a:p>
             <a:fld id="{F0037C11-A992-43DC-841C-4ED15B44942C}" type="datetimeFigureOut">
               <a:rPr lang="en-US" smtClean="0"/>
-              <a:t>2/23/2021</a:t>
+              <a:t>2/24/2021</a:t>
             </a:fld>
             <a:endParaRPr lang="en-US" dirty="0"/>
           </a:p>
@@ -1416,7 +1417,7 @@
           <a:p>
             <a:fld id="{F0037C11-A992-43DC-841C-4ED15B44942C}" type="datetimeFigureOut">
               <a:rPr lang="en-US" smtClean="0"/>
-              <a:t>2/23/2021</a:t>
+              <a:t>2/24/2021</a:t>
             </a:fld>
             <a:endParaRPr lang="en-US" dirty="0"/>
           </a:p>
@@ -1828,7 +1829,7 @@
           <a:p>
             <a:fld id="{F0037C11-A992-43DC-841C-4ED15B44942C}" type="datetimeFigureOut">
               <a:rPr lang="en-US" smtClean="0"/>
-              <a:t>2/23/2021</a:t>
+              <a:t>2/24/2021</a:t>
             </a:fld>
             <a:endParaRPr lang="en-US" dirty="0"/>
           </a:p>
@@ -1969,7 +1970,7 @@
           <a:p>
             <a:fld id="{F0037C11-A992-43DC-841C-4ED15B44942C}" type="datetimeFigureOut">
               <a:rPr lang="en-US" smtClean="0"/>
-              <a:t>2/23/2021</a:t>
+              <a:t>2/24/2021</a:t>
             </a:fld>
             <a:endParaRPr lang="en-US" dirty="0"/>
           </a:p>
@@ -2082,7 +2083,7 @@
           <a:p>
             <a:fld id="{F0037C11-A992-43DC-841C-4ED15B44942C}" type="datetimeFigureOut">
               <a:rPr lang="en-US" smtClean="0"/>
-              <a:t>2/23/2021</a:t>
+              <a:t>2/24/2021</a:t>
             </a:fld>
             <a:endParaRPr lang="en-US" dirty="0"/>
           </a:p>
@@ -2393,7 +2394,7 @@
           <a:p>
             <a:fld id="{F0037C11-A992-43DC-841C-4ED15B44942C}" type="datetimeFigureOut">
               <a:rPr lang="en-US" smtClean="0"/>
-              <a:t>2/23/2021</a:t>
+              <a:t>2/24/2021</a:t>
             </a:fld>
             <a:endParaRPr lang="en-US" dirty="0"/>
           </a:p>
@@ -2681,7 +2682,7 @@
           <a:p>
             <a:fld id="{F0037C11-A992-43DC-841C-4ED15B44942C}" type="datetimeFigureOut">
               <a:rPr lang="en-US" smtClean="0"/>
-              <a:t>2/23/2021</a:t>
+              <a:t>2/24/2021</a:t>
             </a:fld>
             <a:endParaRPr lang="en-US" dirty="0"/>
           </a:p>
@@ -2925,7 +2926,7 @@
           <a:p>
             <a:fld id="{F0037C11-A992-43DC-841C-4ED15B44942C}" type="datetimeFigureOut">
               <a:rPr lang="en-US" smtClean="0"/>
-              <a:t>2/23/2021</a:t>
+              <a:t>2/24/2021</a:t>
             </a:fld>
             <a:endParaRPr lang="en-US" dirty="0"/>
           </a:p>
@@ -4730,6 +4731,291 @@
 </file>
 
 <file path=ppt/slides/slide14.xml><?xml version="1.0" encoding="utf-8"?>
+<p:sld xmlns:a="http://schemas.openxmlformats.org/drawingml/2006/main" xmlns:r="http://schemas.openxmlformats.org/officeDocument/2006/relationships" xmlns:p="http://schemas.openxmlformats.org/presentationml/2006/main">
+  <p:cSld>
+    <p:bg>
+      <p:bgPr>
+        <a:solidFill>
+          <a:schemeClr val="bg1">
+            <a:tint val="95000"/>
+            <a:satMod val="170000"/>
+          </a:schemeClr>
+        </a:solidFill>
+        <a:effectLst/>
+      </p:bgPr>
+    </p:bg>
+    <p:spTree>
+      <p:nvGrpSpPr>
+        <p:cNvPr id="1" name=""/>
+        <p:cNvGrpSpPr/>
+        <p:nvPr/>
+      </p:nvGrpSpPr>
+      <p:grpSpPr>
+        <a:xfrm>
+          <a:off x="0" y="0"/>
+          <a:ext cx="0" cy="0"/>
+          <a:chOff x="0" y="0"/>
+          <a:chExt cx="0" cy="0"/>
+        </a:xfrm>
+      </p:grpSpPr>
+      <p:sp>
+        <p:nvSpPr>
+          <p:cNvPr id="2" name="Title 1">
+            <a:extLst>
+              <a:ext uri="{FF2B5EF4-FFF2-40B4-BE49-F238E27FC236}">
+                <a16:creationId xmlns:a16="http://schemas.microsoft.com/office/drawing/2014/main" id="{D1A5408C-81E2-4CF8-8A28-A61053F6420F}"/>
+              </a:ext>
+            </a:extLst>
+          </p:cNvPr>
+          <p:cNvSpPr>
+            <a:spLocks noGrp="1"/>
+          </p:cNvSpPr>
+          <p:nvPr>
+            <p:ph type="title"/>
+          </p:nvPr>
+        </p:nvSpPr>
+        <p:spPr>
+          <a:xfrm>
+            <a:off x="7464614" y="1783959"/>
+            <a:ext cx="4087306" cy="2889114"/>
+          </a:xfrm>
+        </p:spPr>
+        <p:txBody>
+          <a:bodyPr vert="horz" lIns="91440" tIns="45720" rIns="91440" bIns="45720" rtlCol="0" anchor="b">
+            <a:normAutofit/>
+          </a:bodyPr>
+          <a:lstStyle/>
+          <a:p>
+            <a:r>
+              <a:rPr lang="en-US" sz="4200"/>
+              <a:t>Installing the application libraries from GitHub to Heroku</a:t>
+            </a:r>
+          </a:p>
+        </p:txBody>
+      </p:sp>
+      <p:sp>
+        <p:nvSpPr>
+          <p:cNvPr id="20" name="Freeform: Shape 19">
+            <a:extLst>
+              <a:ext uri="{FF2B5EF4-FFF2-40B4-BE49-F238E27FC236}">
+                <a16:creationId xmlns:a16="http://schemas.microsoft.com/office/drawing/2014/main" id="{E49CC64F-7275-4E33-961B-0C5CDC439875}"/>
+              </a:ext>
+              <a:ext uri="{C183D7F6-B498-43B3-948B-1728B52AA6E4}">
+                <adec:decorative xmlns:adec="http://schemas.microsoft.com/office/drawing/2017/decorative" val="1"/>
+              </a:ext>
+            </a:extLst>
+          </p:cNvPr>
+          <p:cNvSpPr>
+            <a:spLocks noGrp="1" noRot="1" noChangeAspect="1" noMove="1" noResize="1" noEditPoints="1" noAdjustHandles="1" noChangeArrowheads="1" noChangeShapeType="1" noTextEdit="1"/>
+          </p:cNvSpPr>
+          <p:nvPr>
+            <p:extLst>
+              <p:ext uri="{386F3935-93C4-4BCD-93E2-E3B085C9AB24}">
+                <p16:designElem xmlns:p16="http://schemas.microsoft.com/office/powerpoint/2015/main" val="1"/>
+              </p:ext>
+            </p:extLst>
+          </p:nvPr>
+        </p:nvSpPr>
+        <p:spPr>
+          <a:xfrm flipH="1" flipV="1">
+            <a:off x="1" y="0"/>
+            <a:ext cx="7188051" cy="6858000"/>
+          </a:xfrm>
+          <a:custGeom>
+            <a:avLst/>
+            <a:gdLst>
+              <a:gd name="connsiteX0" fmla="*/ 7188051 w 7188051"/>
+              <a:gd name="connsiteY0" fmla="*/ 6858000 h 6858000"/>
+              <a:gd name="connsiteX1" fmla="*/ 108694 w 7188051"/>
+              <a:gd name="connsiteY1" fmla="*/ 6858000 h 6858000"/>
+              <a:gd name="connsiteX2" fmla="*/ 79127 w 7188051"/>
+              <a:gd name="connsiteY2" fmla="*/ 6681235 h 6858000"/>
+              <a:gd name="connsiteX3" fmla="*/ 0 w 7188051"/>
+              <a:gd name="connsiteY3" fmla="*/ 5565888 h 6858000"/>
+              <a:gd name="connsiteX4" fmla="*/ 2190696 w 7188051"/>
+              <a:gd name="connsiteY4" fmla="*/ 145339 h 6858000"/>
+              <a:gd name="connsiteX5" fmla="*/ 2339431 w 7188051"/>
+              <a:gd name="connsiteY5" fmla="*/ 0 h 6858000"/>
+              <a:gd name="connsiteX6" fmla="*/ 7188051 w 7188051"/>
+              <a:gd name="connsiteY6" fmla="*/ 0 h 6858000"/>
+            </a:gdLst>
+            <a:ahLst/>
+            <a:cxnLst>
+              <a:cxn ang="0">
+                <a:pos x="connsiteX0" y="connsiteY0"/>
+              </a:cxn>
+              <a:cxn ang="0">
+                <a:pos x="connsiteX1" y="connsiteY1"/>
+              </a:cxn>
+              <a:cxn ang="0">
+                <a:pos x="connsiteX2" y="connsiteY2"/>
+              </a:cxn>
+              <a:cxn ang="0">
+                <a:pos x="connsiteX3" y="connsiteY3"/>
+              </a:cxn>
+              <a:cxn ang="0">
+                <a:pos x="connsiteX4" y="connsiteY4"/>
+              </a:cxn>
+              <a:cxn ang="0">
+                <a:pos x="connsiteX5" y="connsiteY5"/>
+              </a:cxn>
+              <a:cxn ang="0">
+                <a:pos x="connsiteX6" y="connsiteY6"/>
+              </a:cxn>
+            </a:cxnLst>
+            <a:rect l="l" t="t" r="r" b="b"/>
+            <a:pathLst>
+              <a:path w="7188051" h="6858000">
+                <a:moveTo>
+                  <a:pt x="7188051" y="6858000"/>
+                </a:moveTo>
+                <a:lnTo>
+                  <a:pt x="108694" y="6858000"/>
+                </a:lnTo>
+                <a:lnTo>
+                  <a:pt x="79127" y="6681235"/>
+                </a:lnTo>
+                <a:cubicBezTo>
+                  <a:pt x="26981" y="6316967"/>
+                  <a:pt x="0" y="5944579"/>
+                  <a:pt x="0" y="5565888"/>
+                </a:cubicBezTo>
+                <a:cubicBezTo>
+                  <a:pt x="0" y="3459953"/>
+                  <a:pt x="834428" y="1548908"/>
+                  <a:pt x="2190696" y="145339"/>
+                </a:cubicBezTo>
+                <a:lnTo>
+                  <a:pt x="2339431" y="0"/>
+                </a:lnTo>
+                <a:lnTo>
+                  <a:pt x="7188051" y="0"/>
+                </a:lnTo>
+                <a:close/>
+              </a:path>
+            </a:pathLst>
+          </a:custGeom>
+          <a:solidFill>
+            <a:schemeClr val="tx1">
+              <a:alpha val="80000"/>
+            </a:schemeClr>
+          </a:solidFill>
+          <a:ln>
+            <a:noFill/>
+          </a:ln>
+        </p:spPr>
+        <p:style>
+          <a:lnRef idx="2">
+            <a:schemeClr val="accent1">
+              <a:shade val="50000"/>
+            </a:schemeClr>
+          </a:lnRef>
+          <a:fillRef idx="1">
+            <a:schemeClr val="accent1"/>
+          </a:fillRef>
+          <a:effectRef idx="0">
+            <a:schemeClr val="accent1"/>
+          </a:effectRef>
+          <a:fontRef idx="minor">
+            <a:schemeClr val="lt1"/>
+          </a:fontRef>
+        </p:style>
+        <p:txBody>
+          <a:bodyPr wrap="square" rtlCol="0" anchor="ctr">
+            <a:noAutofit/>
+          </a:bodyPr>
+          <a:lstStyle/>
+          <a:p>
+            <a:pPr algn="ctr"/>
+            <a:endParaRPr lang="en-US"/>
+          </a:p>
+        </p:txBody>
+      </p:sp>
+      <p:pic>
+        <p:nvPicPr>
+          <p:cNvPr id="10" name="Content Placeholder 9" descr="Graphical user interface, text, application, email&#10;&#10;Description automatically generated">
+            <a:extLst>
+              <a:ext uri="{FF2B5EF4-FFF2-40B4-BE49-F238E27FC236}">
+                <a16:creationId xmlns:a16="http://schemas.microsoft.com/office/drawing/2014/main" id="{572CD9E2-AA2F-4FA4-9B39-70490CC3ED4F}"/>
+              </a:ext>
+            </a:extLst>
+          </p:cNvPr>
+          <p:cNvPicPr>
+            <a:picLocks noGrp="1" noChangeAspect="1"/>
+          </p:cNvPicPr>
+          <p:nvPr>
+            <p:ph idx="1"/>
+          </p:nvPr>
+        </p:nvPicPr>
+        <p:blipFill rotWithShape="1">
+          <a:blip r:embed="rId2">
+            <a:extLst>
+              <a:ext uri="{28A0092B-C50C-407E-A947-70E740481C1C}">
+                <a14:useLocalDpi xmlns:a14="http://schemas.microsoft.com/office/drawing/2010/main" val="0"/>
+              </a:ext>
+            </a:extLst>
+          </a:blip>
+          <a:srcRect l="7399" r="40333" b="1"/>
+          <a:stretch/>
+        </p:blipFill>
+        <p:spPr>
+          <a:xfrm>
+            <a:off x="1" y="10"/>
+            <a:ext cx="7028495" cy="6857990"/>
+          </a:xfrm>
+          <a:custGeom>
+            <a:avLst/>
+            <a:gdLst/>
+            <a:ahLst/>
+            <a:cxnLst/>
+            <a:rect l="l" t="t" r="r" b="b"/>
+            <a:pathLst>
+              <a:path w="7028495" h="6858000">
+                <a:moveTo>
+                  <a:pt x="0" y="0"/>
+                </a:moveTo>
+                <a:lnTo>
+                  <a:pt x="6915668" y="0"/>
+                </a:lnTo>
+                <a:lnTo>
+                  <a:pt x="6952411" y="219663"/>
+                </a:lnTo>
+                <a:cubicBezTo>
+                  <a:pt x="7002551" y="569921"/>
+                  <a:pt x="7028495" y="927986"/>
+                  <a:pt x="7028495" y="1292112"/>
+                </a:cubicBezTo>
+                <a:cubicBezTo>
+                  <a:pt x="7028495" y="3343346"/>
+                  <a:pt x="6205186" y="5202289"/>
+                  <a:pt x="4870994" y="6556512"/>
+                </a:cubicBezTo>
+                <a:lnTo>
+                  <a:pt x="4556185" y="6858000"/>
+                </a:lnTo>
+                <a:lnTo>
+                  <a:pt x="0" y="6858000"/>
+                </a:lnTo>
+                <a:close/>
+              </a:path>
+            </a:pathLst>
+          </a:custGeom>
+        </p:spPr>
+      </p:pic>
+    </p:spTree>
+    <p:extLst>
+      <p:ext uri="{BB962C8B-B14F-4D97-AF65-F5344CB8AC3E}">
+        <p14:creationId xmlns:p14="http://schemas.microsoft.com/office/powerpoint/2010/main" val="2488687694"/>
+      </p:ext>
+    </p:extLst>
+  </p:cSld>
+  <p:clrMapOvr>
+    <a:overrideClrMapping bg1="dk1" tx1="lt1" bg2="dk2" tx2="lt2" accent1="accent1" accent2="accent2" accent3="accent3" accent4="accent4" accent5="accent5" accent6="accent6" hlink="hlink" folHlink="folHlink"/>
+  </p:clrMapOvr>
+</p:sld>
+</file>
+
+<file path=ppt/slides/slide15.xml><?xml version="1.0" encoding="utf-8"?>
 <p:sld xmlns:a="http://schemas.openxmlformats.org/drawingml/2006/main" xmlns:r="http://schemas.openxmlformats.org/officeDocument/2006/relationships" xmlns:p="http://schemas.openxmlformats.org/presentationml/2006/main">
   <p:cSld>
     <p:bg>

</xml_diff>

<commit_message>
Adds changes to the presentation
</commit_message>
<xml_diff>
--- a/Loan approval project 3.pptx
+++ b/Loan approval project 3.pptx
@@ -4,6 +4,9 @@
   <p:sldMasterIdLst>
     <p:sldMasterId id="2147483648" r:id="rId1"/>
   </p:sldMasterIdLst>
+  <p:notesMasterIdLst>
+    <p:notesMasterId r:id="rId17"/>
+  </p:notesMasterIdLst>
   <p:sldIdLst>
     <p:sldId id="256" r:id="rId2"/>
     <p:sldId id="272" r:id="rId3"/>
@@ -126,6 +129,562 @@
 </p:presentation>
 </file>
 
+<file path=ppt/notesMasters/notesMaster1.xml><?xml version="1.0" encoding="utf-8"?>
+<p:notesMaster xmlns:a="http://schemas.openxmlformats.org/drawingml/2006/main" xmlns:r="http://schemas.openxmlformats.org/officeDocument/2006/relationships" xmlns:p="http://schemas.openxmlformats.org/presentationml/2006/main">
+  <p:cSld>
+    <p:bg>
+      <p:bgRef idx="1001">
+        <a:schemeClr val="bg1"/>
+      </p:bgRef>
+    </p:bg>
+    <p:spTree>
+      <p:nvGrpSpPr>
+        <p:cNvPr id="1" name=""/>
+        <p:cNvGrpSpPr/>
+        <p:nvPr/>
+      </p:nvGrpSpPr>
+      <p:grpSpPr>
+        <a:xfrm>
+          <a:off x="0" y="0"/>
+          <a:ext cx="0" cy="0"/>
+          <a:chOff x="0" y="0"/>
+          <a:chExt cx="0" cy="0"/>
+        </a:xfrm>
+      </p:grpSpPr>
+      <p:sp>
+        <p:nvSpPr>
+          <p:cNvPr id="2" name="Header Placeholder 1"/>
+          <p:cNvSpPr>
+            <a:spLocks noGrp="1"/>
+          </p:cNvSpPr>
+          <p:nvPr>
+            <p:ph type="hdr" sz="quarter"/>
+          </p:nvPr>
+        </p:nvSpPr>
+        <p:spPr>
+          <a:xfrm>
+            <a:off x="0" y="0"/>
+            <a:ext cx="2971800" cy="458788"/>
+          </a:xfrm>
+          <a:prstGeom prst="rect">
+            <a:avLst/>
+          </a:prstGeom>
+        </p:spPr>
+        <p:txBody>
+          <a:bodyPr vert="horz" lIns="91440" tIns="45720" rIns="91440" bIns="45720" rtlCol="0"/>
+          <a:lstStyle>
+            <a:lvl1pPr algn="l">
+              <a:defRPr sz="1200"/>
+            </a:lvl1pPr>
+          </a:lstStyle>
+          <a:p>
+            <a:endParaRPr lang="en-US"/>
+          </a:p>
+        </p:txBody>
+      </p:sp>
+      <p:sp>
+        <p:nvSpPr>
+          <p:cNvPr id="3" name="Date Placeholder 2"/>
+          <p:cNvSpPr>
+            <a:spLocks noGrp="1"/>
+          </p:cNvSpPr>
+          <p:nvPr>
+            <p:ph type="dt" idx="1"/>
+          </p:nvPr>
+        </p:nvSpPr>
+        <p:spPr>
+          <a:xfrm>
+            <a:off x="3884613" y="0"/>
+            <a:ext cx="2971800" cy="458788"/>
+          </a:xfrm>
+          <a:prstGeom prst="rect">
+            <a:avLst/>
+          </a:prstGeom>
+        </p:spPr>
+        <p:txBody>
+          <a:bodyPr vert="horz" lIns="91440" tIns="45720" rIns="91440" bIns="45720" rtlCol="0"/>
+          <a:lstStyle>
+            <a:lvl1pPr algn="r">
+              <a:defRPr sz="1200"/>
+            </a:lvl1pPr>
+          </a:lstStyle>
+          <a:p>
+            <a:fld id="{6CF55F94-BEC6-1147-918F-329F1030B0F3}" type="datetimeFigureOut">
+              <a:rPr lang="en-US" smtClean="0"/>
+              <a:t>2/24/21</a:t>
+            </a:fld>
+            <a:endParaRPr lang="en-US"/>
+          </a:p>
+        </p:txBody>
+      </p:sp>
+      <p:sp>
+        <p:nvSpPr>
+          <p:cNvPr id="4" name="Slide Image Placeholder 3"/>
+          <p:cNvSpPr>
+            <a:spLocks noGrp="1" noRot="1" noChangeAspect="1"/>
+          </p:cNvSpPr>
+          <p:nvPr>
+            <p:ph type="sldImg" idx="2"/>
+          </p:nvPr>
+        </p:nvSpPr>
+        <p:spPr>
+          <a:xfrm>
+            <a:off x="685800" y="1143000"/>
+            <a:ext cx="5486400" cy="3086100"/>
+          </a:xfrm>
+          <a:prstGeom prst="rect">
+            <a:avLst/>
+          </a:prstGeom>
+          <a:noFill/>
+          <a:ln w="12700">
+            <a:solidFill>
+              <a:prstClr val="black"/>
+            </a:solidFill>
+          </a:ln>
+        </p:spPr>
+        <p:txBody>
+          <a:bodyPr vert="horz" lIns="91440" tIns="45720" rIns="91440" bIns="45720" rtlCol="0" anchor="ctr"/>
+          <a:lstStyle/>
+          <a:p>
+            <a:endParaRPr lang="en-US"/>
+          </a:p>
+        </p:txBody>
+      </p:sp>
+      <p:sp>
+        <p:nvSpPr>
+          <p:cNvPr id="5" name="Notes Placeholder 4"/>
+          <p:cNvSpPr>
+            <a:spLocks noGrp="1"/>
+          </p:cNvSpPr>
+          <p:nvPr>
+            <p:ph type="body" sz="quarter" idx="3"/>
+          </p:nvPr>
+        </p:nvSpPr>
+        <p:spPr>
+          <a:xfrm>
+            <a:off x="685800" y="4400550"/>
+            <a:ext cx="5486400" cy="3600450"/>
+          </a:xfrm>
+          <a:prstGeom prst="rect">
+            <a:avLst/>
+          </a:prstGeom>
+        </p:spPr>
+        <p:txBody>
+          <a:bodyPr vert="horz" lIns="91440" tIns="45720" rIns="91440" bIns="45720" rtlCol="0"/>
+          <a:lstStyle/>
+          <a:p>
+            <a:pPr lvl="0"/>
+            <a:r>
+              <a:rPr lang="en-US"/>
+              <a:t>Click to edit Master text styles</a:t>
+            </a:r>
+          </a:p>
+          <a:p>
+            <a:pPr lvl="1"/>
+            <a:r>
+              <a:rPr lang="en-US"/>
+              <a:t>Second level</a:t>
+            </a:r>
+          </a:p>
+          <a:p>
+            <a:pPr lvl="2"/>
+            <a:r>
+              <a:rPr lang="en-US"/>
+              <a:t>Third level</a:t>
+            </a:r>
+          </a:p>
+          <a:p>
+            <a:pPr lvl="3"/>
+            <a:r>
+              <a:rPr lang="en-US"/>
+              <a:t>Fourth level</a:t>
+            </a:r>
+          </a:p>
+          <a:p>
+            <a:pPr lvl="4"/>
+            <a:r>
+              <a:rPr lang="en-US"/>
+              <a:t>Fifth level</a:t>
+            </a:r>
+          </a:p>
+        </p:txBody>
+      </p:sp>
+      <p:sp>
+        <p:nvSpPr>
+          <p:cNvPr id="6" name="Footer Placeholder 5"/>
+          <p:cNvSpPr>
+            <a:spLocks noGrp="1"/>
+          </p:cNvSpPr>
+          <p:nvPr>
+            <p:ph type="ftr" sz="quarter" idx="4"/>
+          </p:nvPr>
+        </p:nvSpPr>
+        <p:spPr>
+          <a:xfrm>
+            <a:off x="0" y="8685213"/>
+            <a:ext cx="2971800" cy="458787"/>
+          </a:xfrm>
+          <a:prstGeom prst="rect">
+            <a:avLst/>
+          </a:prstGeom>
+        </p:spPr>
+        <p:txBody>
+          <a:bodyPr vert="horz" lIns="91440" tIns="45720" rIns="91440" bIns="45720" rtlCol="0" anchor="b"/>
+          <a:lstStyle>
+            <a:lvl1pPr algn="l">
+              <a:defRPr sz="1200"/>
+            </a:lvl1pPr>
+          </a:lstStyle>
+          <a:p>
+            <a:endParaRPr lang="en-US"/>
+          </a:p>
+        </p:txBody>
+      </p:sp>
+      <p:sp>
+        <p:nvSpPr>
+          <p:cNvPr id="7" name="Slide Number Placeholder 6"/>
+          <p:cNvSpPr>
+            <a:spLocks noGrp="1"/>
+          </p:cNvSpPr>
+          <p:nvPr>
+            <p:ph type="sldNum" sz="quarter" idx="5"/>
+          </p:nvPr>
+        </p:nvSpPr>
+        <p:spPr>
+          <a:xfrm>
+            <a:off x="3884613" y="8685213"/>
+            <a:ext cx="2971800" cy="458787"/>
+          </a:xfrm>
+          <a:prstGeom prst="rect">
+            <a:avLst/>
+          </a:prstGeom>
+        </p:spPr>
+        <p:txBody>
+          <a:bodyPr vert="horz" lIns="91440" tIns="45720" rIns="91440" bIns="45720" rtlCol="0" anchor="b"/>
+          <a:lstStyle>
+            <a:lvl1pPr algn="r">
+              <a:defRPr sz="1200"/>
+            </a:lvl1pPr>
+          </a:lstStyle>
+          <a:p>
+            <a:fld id="{F7E85EFE-828A-A74F-92A0-E2EA5D7C862F}" type="slidenum">
+              <a:rPr lang="en-US" smtClean="0"/>
+              <a:t>‹#›</a:t>
+            </a:fld>
+            <a:endParaRPr lang="en-US"/>
+          </a:p>
+        </p:txBody>
+      </p:sp>
+    </p:spTree>
+    <p:extLst>
+      <p:ext uri="{BB962C8B-B14F-4D97-AF65-F5344CB8AC3E}">
+        <p14:creationId xmlns:p14="http://schemas.microsoft.com/office/powerpoint/2010/main" val="2757324750"/>
+      </p:ext>
+    </p:extLst>
+  </p:cSld>
+  <p:clrMap bg1="lt1" tx1="dk1" bg2="lt2" tx2="dk2" accent1="accent1" accent2="accent2" accent3="accent3" accent4="accent4" accent5="accent5" accent6="accent6" hlink="hlink" folHlink="folHlink"/>
+  <p:notesStyle>
+    <a:lvl1pPr marL="0" algn="l" defTabSz="914400" rtl="0" eaLnBrk="1" latinLnBrk="0" hangingPunct="1">
+      <a:defRPr sz="1200" kern="1200">
+        <a:solidFill>
+          <a:schemeClr val="tx1"/>
+        </a:solidFill>
+        <a:latin typeface="+mn-lt"/>
+        <a:ea typeface="+mn-ea"/>
+        <a:cs typeface="+mn-cs"/>
+      </a:defRPr>
+    </a:lvl1pPr>
+    <a:lvl2pPr marL="457200" algn="l" defTabSz="914400" rtl="0" eaLnBrk="1" latinLnBrk="0" hangingPunct="1">
+      <a:defRPr sz="1200" kern="1200">
+        <a:solidFill>
+          <a:schemeClr val="tx1"/>
+        </a:solidFill>
+        <a:latin typeface="+mn-lt"/>
+        <a:ea typeface="+mn-ea"/>
+        <a:cs typeface="+mn-cs"/>
+      </a:defRPr>
+    </a:lvl2pPr>
+    <a:lvl3pPr marL="914400" algn="l" defTabSz="914400" rtl="0" eaLnBrk="1" latinLnBrk="0" hangingPunct="1">
+      <a:defRPr sz="1200" kern="1200">
+        <a:solidFill>
+          <a:schemeClr val="tx1"/>
+        </a:solidFill>
+        <a:latin typeface="+mn-lt"/>
+        <a:ea typeface="+mn-ea"/>
+        <a:cs typeface="+mn-cs"/>
+      </a:defRPr>
+    </a:lvl3pPr>
+    <a:lvl4pPr marL="1371600" algn="l" defTabSz="914400" rtl="0" eaLnBrk="1" latinLnBrk="0" hangingPunct="1">
+      <a:defRPr sz="1200" kern="1200">
+        <a:solidFill>
+          <a:schemeClr val="tx1"/>
+        </a:solidFill>
+        <a:latin typeface="+mn-lt"/>
+        <a:ea typeface="+mn-ea"/>
+        <a:cs typeface="+mn-cs"/>
+      </a:defRPr>
+    </a:lvl4pPr>
+    <a:lvl5pPr marL="1828800" algn="l" defTabSz="914400" rtl="0" eaLnBrk="1" latinLnBrk="0" hangingPunct="1">
+      <a:defRPr sz="1200" kern="1200">
+        <a:solidFill>
+          <a:schemeClr val="tx1"/>
+        </a:solidFill>
+        <a:latin typeface="+mn-lt"/>
+        <a:ea typeface="+mn-ea"/>
+        <a:cs typeface="+mn-cs"/>
+      </a:defRPr>
+    </a:lvl5pPr>
+    <a:lvl6pPr marL="2286000" algn="l" defTabSz="914400" rtl="0" eaLnBrk="1" latinLnBrk="0" hangingPunct="1">
+      <a:defRPr sz="1200" kern="1200">
+        <a:solidFill>
+          <a:schemeClr val="tx1"/>
+        </a:solidFill>
+        <a:latin typeface="+mn-lt"/>
+        <a:ea typeface="+mn-ea"/>
+        <a:cs typeface="+mn-cs"/>
+      </a:defRPr>
+    </a:lvl6pPr>
+    <a:lvl7pPr marL="2743200" algn="l" defTabSz="914400" rtl="0" eaLnBrk="1" latinLnBrk="0" hangingPunct="1">
+      <a:defRPr sz="1200" kern="1200">
+        <a:solidFill>
+          <a:schemeClr val="tx1"/>
+        </a:solidFill>
+        <a:latin typeface="+mn-lt"/>
+        <a:ea typeface="+mn-ea"/>
+        <a:cs typeface="+mn-cs"/>
+      </a:defRPr>
+    </a:lvl7pPr>
+    <a:lvl8pPr marL="3200400" algn="l" defTabSz="914400" rtl="0" eaLnBrk="1" latinLnBrk="0" hangingPunct="1">
+      <a:defRPr sz="1200" kern="1200">
+        <a:solidFill>
+          <a:schemeClr val="tx1"/>
+        </a:solidFill>
+        <a:latin typeface="+mn-lt"/>
+        <a:ea typeface="+mn-ea"/>
+        <a:cs typeface="+mn-cs"/>
+      </a:defRPr>
+    </a:lvl8pPr>
+    <a:lvl9pPr marL="3657600" algn="l" defTabSz="914400" rtl="0" eaLnBrk="1" latinLnBrk="0" hangingPunct="1">
+      <a:defRPr sz="1200" kern="1200">
+        <a:solidFill>
+          <a:schemeClr val="tx1"/>
+        </a:solidFill>
+        <a:latin typeface="+mn-lt"/>
+        <a:ea typeface="+mn-ea"/>
+        <a:cs typeface="+mn-cs"/>
+      </a:defRPr>
+    </a:lvl9pPr>
+  </p:notesStyle>
+</p:notesMaster>
+</file>
+
+<file path=ppt/notesSlides/notesSlide1.xml><?xml version="1.0" encoding="utf-8"?>
+<p:notes xmlns:a="http://schemas.openxmlformats.org/drawingml/2006/main" xmlns:r="http://schemas.openxmlformats.org/officeDocument/2006/relationships" xmlns:p="http://schemas.openxmlformats.org/presentationml/2006/main">
+  <p:cSld>
+    <p:spTree>
+      <p:nvGrpSpPr>
+        <p:cNvPr id="1" name=""/>
+        <p:cNvGrpSpPr/>
+        <p:nvPr/>
+      </p:nvGrpSpPr>
+      <p:grpSpPr>
+        <a:xfrm>
+          <a:off x="0" y="0"/>
+          <a:ext cx="0" cy="0"/>
+          <a:chOff x="0" y="0"/>
+          <a:chExt cx="0" cy="0"/>
+        </a:xfrm>
+      </p:grpSpPr>
+      <p:sp>
+        <p:nvSpPr>
+          <p:cNvPr id="2" name="Slide Image Placeholder 1"/>
+          <p:cNvSpPr>
+            <a:spLocks noGrp="1" noRot="1" noChangeAspect="1"/>
+          </p:cNvSpPr>
+          <p:nvPr>
+            <p:ph type="sldImg"/>
+          </p:nvPr>
+        </p:nvSpPr>
+        <p:spPr/>
+      </p:sp>
+      <p:sp>
+        <p:nvSpPr>
+          <p:cNvPr id="3" name="Notes Placeholder 2"/>
+          <p:cNvSpPr>
+            <a:spLocks noGrp="1"/>
+          </p:cNvSpPr>
+          <p:nvPr>
+            <p:ph type="body" idx="1"/>
+          </p:nvPr>
+        </p:nvSpPr>
+        <p:spPr/>
+        <p:txBody>
+          <a:bodyPr/>
+          <a:lstStyle/>
+          <a:p>
+            <a:endParaRPr lang="en-US" dirty="0"/>
+          </a:p>
+        </p:txBody>
+      </p:sp>
+      <p:sp>
+        <p:nvSpPr>
+          <p:cNvPr id="4" name="Slide Number Placeholder 3"/>
+          <p:cNvSpPr>
+            <a:spLocks noGrp="1"/>
+          </p:cNvSpPr>
+          <p:nvPr>
+            <p:ph type="sldNum" sz="quarter" idx="5"/>
+          </p:nvPr>
+        </p:nvSpPr>
+        <p:spPr/>
+        <p:txBody>
+          <a:bodyPr/>
+          <a:lstStyle/>
+          <a:p>
+            <a:fld id="{F7E85EFE-828A-A74F-92A0-E2EA5D7C862F}" type="slidenum">
+              <a:rPr lang="en-US" smtClean="0"/>
+              <a:t>6</a:t>
+            </a:fld>
+            <a:endParaRPr lang="en-US"/>
+          </a:p>
+        </p:txBody>
+      </p:sp>
+    </p:spTree>
+    <p:extLst>
+      <p:ext uri="{BB962C8B-B14F-4D97-AF65-F5344CB8AC3E}">
+        <p14:creationId xmlns:p14="http://schemas.microsoft.com/office/powerpoint/2010/main" val="1116778918"/>
+      </p:ext>
+    </p:extLst>
+  </p:cSld>
+  <p:clrMapOvr>
+    <a:masterClrMapping/>
+  </p:clrMapOvr>
+</p:notes>
+</file>
+
+<file path=ppt/notesSlides/notesSlide2.xml><?xml version="1.0" encoding="utf-8"?>
+<p:notes xmlns:a="http://schemas.openxmlformats.org/drawingml/2006/main" xmlns:r="http://schemas.openxmlformats.org/officeDocument/2006/relationships" xmlns:p="http://schemas.openxmlformats.org/presentationml/2006/main">
+  <p:cSld>
+    <p:spTree>
+      <p:nvGrpSpPr>
+        <p:cNvPr id="1" name=""/>
+        <p:cNvGrpSpPr/>
+        <p:nvPr/>
+      </p:nvGrpSpPr>
+      <p:grpSpPr>
+        <a:xfrm>
+          <a:off x="0" y="0"/>
+          <a:ext cx="0" cy="0"/>
+          <a:chOff x="0" y="0"/>
+          <a:chExt cx="0" cy="0"/>
+        </a:xfrm>
+      </p:grpSpPr>
+      <p:sp>
+        <p:nvSpPr>
+          <p:cNvPr id="2" name="Slide Image Placeholder 1"/>
+          <p:cNvSpPr>
+            <a:spLocks noGrp="1" noRot="1" noChangeAspect="1"/>
+          </p:cNvSpPr>
+          <p:nvPr>
+            <p:ph type="sldImg"/>
+          </p:nvPr>
+        </p:nvSpPr>
+        <p:spPr/>
+      </p:sp>
+      <p:sp>
+        <p:nvSpPr>
+          <p:cNvPr id="3" name="Notes Placeholder 2"/>
+          <p:cNvSpPr>
+            <a:spLocks noGrp="1"/>
+          </p:cNvSpPr>
+          <p:nvPr>
+            <p:ph type="body" idx="1"/>
+          </p:nvPr>
+        </p:nvSpPr>
+        <p:spPr/>
+        <p:txBody>
+          <a:bodyPr/>
+          <a:lstStyle/>
+          <a:p>
+            <a:r>
+              <a:rPr lang="en-US" b="1" dirty="0"/>
+              <a:t>One-Hot Encoded:</a:t>
+            </a:r>
+          </a:p>
+          <a:p>
+            <a:r>
+              <a:rPr lang="en-US" dirty="0"/>
+              <a:t>0 Gender (Male/Female)</a:t>
+            </a:r>
+          </a:p>
+          <a:p>
+            <a:r>
+              <a:rPr lang="en-US" dirty="0"/>
+              <a:t>1 Married (Y/N)</a:t>
+            </a:r>
+          </a:p>
+          <a:p>
+            <a:r>
+              <a:rPr lang="en-US" dirty="0"/>
+              <a:t>2 Dependents (0, 1, 2, 3+)</a:t>
+            </a:r>
+          </a:p>
+          <a:p>
+            <a:r>
+              <a:rPr lang="en-US" dirty="0"/>
+              <a:t>3 Education (Graduate/Not Graduate)</a:t>
+            </a:r>
+          </a:p>
+          <a:p>
+            <a:r>
+              <a:rPr lang="en-US" dirty="0"/>
+              <a:t>4 Self-Employed (Y/N)</a:t>
+            </a:r>
+          </a:p>
+          <a:p>
+            <a:r>
+              <a:rPr lang="en-US" dirty="0"/>
+              <a:t>5 Property type (Urban, Semiurban, Rural)</a:t>
+            </a:r>
+          </a:p>
+        </p:txBody>
+      </p:sp>
+      <p:sp>
+        <p:nvSpPr>
+          <p:cNvPr id="4" name="Slide Number Placeholder 3"/>
+          <p:cNvSpPr>
+            <a:spLocks noGrp="1"/>
+          </p:cNvSpPr>
+          <p:nvPr>
+            <p:ph type="sldNum" sz="quarter" idx="5"/>
+          </p:nvPr>
+        </p:nvSpPr>
+        <p:spPr/>
+        <p:txBody>
+          <a:bodyPr/>
+          <a:lstStyle/>
+          <a:p>
+            <a:fld id="{F7E85EFE-828A-A74F-92A0-E2EA5D7C862F}" type="slidenum">
+              <a:rPr lang="en-US" smtClean="0"/>
+              <a:t>9</a:t>
+            </a:fld>
+            <a:endParaRPr lang="en-US"/>
+          </a:p>
+        </p:txBody>
+      </p:sp>
+    </p:spTree>
+    <p:extLst>
+      <p:ext uri="{BB962C8B-B14F-4D97-AF65-F5344CB8AC3E}">
+        <p14:creationId xmlns:p14="http://schemas.microsoft.com/office/powerpoint/2010/main" val="2795357878"/>
+      </p:ext>
+    </p:extLst>
+  </p:cSld>
+  <p:clrMapOvr>
+    <a:masterClrMapping/>
+  </p:clrMapOvr>
+</p:notes>
+</file>
+
 <file path=ppt/slideLayouts/slideLayout1.xml><?xml version="1.0" encoding="utf-8"?>
 <p:sldLayout xmlns:a="http://schemas.openxmlformats.org/drawingml/2006/main" xmlns:r="http://schemas.openxmlformats.org/officeDocument/2006/relationships" xmlns:p="http://schemas.openxmlformats.org/presentationml/2006/main" type="title" preserve="1">
   <p:cSld name="Title Slide">
@@ -273,7 +832,7 @@
           <a:p>
             <a:fld id="{F0037C11-A992-43DC-841C-4ED15B44942C}" type="datetimeFigureOut">
               <a:rPr lang="en-US" smtClean="0"/>
-              <a:t>2/24/2021</a:t>
+              <a:t>2/24/21</a:t>
             </a:fld>
             <a:endParaRPr lang="en-US" dirty="0"/>
           </a:p>
@@ -471,7 +1030,7 @@
           <a:p>
             <a:fld id="{F0037C11-A992-43DC-841C-4ED15B44942C}" type="datetimeFigureOut">
               <a:rPr lang="en-US" smtClean="0"/>
-              <a:t>2/24/2021</a:t>
+              <a:t>2/24/21</a:t>
             </a:fld>
             <a:endParaRPr lang="en-US" dirty="0"/>
           </a:p>
@@ -679,7 +1238,7 @@
           <a:p>
             <a:fld id="{F0037C11-A992-43DC-841C-4ED15B44942C}" type="datetimeFigureOut">
               <a:rPr lang="en-US" smtClean="0"/>
-              <a:t>2/24/2021</a:t>
+              <a:t>2/24/21</a:t>
             </a:fld>
             <a:endParaRPr lang="en-US" dirty="0"/>
           </a:p>
@@ -877,7 +1436,7 @@
           <a:p>
             <a:fld id="{F0037C11-A992-43DC-841C-4ED15B44942C}" type="datetimeFigureOut">
               <a:rPr lang="en-US" smtClean="0"/>
-              <a:t>2/24/2021</a:t>
+              <a:t>2/24/21</a:t>
             </a:fld>
             <a:endParaRPr lang="en-US" dirty="0"/>
           </a:p>
@@ -1152,7 +1711,7 @@
           <a:p>
             <a:fld id="{F0037C11-A992-43DC-841C-4ED15B44942C}" type="datetimeFigureOut">
               <a:rPr lang="en-US" smtClean="0"/>
-              <a:t>2/24/2021</a:t>
+              <a:t>2/24/21</a:t>
             </a:fld>
             <a:endParaRPr lang="en-US" dirty="0"/>
           </a:p>
@@ -1417,7 +1976,7 @@
           <a:p>
             <a:fld id="{F0037C11-A992-43DC-841C-4ED15B44942C}" type="datetimeFigureOut">
               <a:rPr lang="en-US" smtClean="0"/>
-              <a:t>2/24/2021</a:t>
+              <a:t>2/24/21</a:t>
             </a:fld>
             <a:endParaRPr lang="en-US" dirty="0"/>
           </a:p>
@@ -1829,7 +2388,7 @@
           <a:p>
             <a:fld id="{F0037C11-A992-43DC-841C-4ED15B44942C}" type="datetimeFigureOut">
               <a:rPr lang="en-US" smtClean="0"/>
-              <a:t>2/24/2021</a:t>
+              <a:t>2/24/21</a:t>
             </a:fld>
             <a:endParaRPr lang="en-US" dirty="0"/>
           </a:p>
@@ -1970,7 +2529,7 @@
           <a:p>
             <a:fld id="{F0037C11-A992-43DC-841C-4ED15B44942C}" type="datetimeFigureOut">
               <a:rPr lang="en-US" smtClean="0"/>
-              <a:t>2/24/2021</a:t>
+              <a:t>2/24/21</a:t>
             </a:fld>
             <a:endParaRPr lang="en-US" dirty="0"/>
           </a:p>
@@ -2083,7 +2642,7 @@
           <a:p>
             <a:fld id="{F0037C11-A992-43DC-841C-4ED15B44942C}" type="datetimeFigureOut">
               <a:rPr lang="en-US" smtClean="0"/>
-              <a:t>2/24/2021</a:t>
+              <a:t>2/24/21</a:t>
             </a:fld>
             <a:endParaRPr lang="en-US" dirty="0"/>
           </a:p>
@@ -2394,7 +2953,7 @@
           <a:p>
             <a:fld id="{F0037C11-A992-43DC-841C-4ED15B44942C}" type="datetimeFigureOut">
               <a:rPr lang="en-US" smtClean="0"/>
-              <a:t>2/24/2021</a:t>
+              <a:t>2/24/21</a:t>
             </a:fld>
             <a:endParaRPr lang="en-US" dirty="0"/>
           </a:p>
@@ -2682,7 +3241,7 @@
           <a:p>
             <a:fld id="{F0037C11-A992-43DC-841C-4ED15B44942C}" type="datetimeFigureOut">
               <a:rPr lang="en-US" smtClean="0"/>
-              <a:t>2/24/2021</a:t>
+              <a:t>2/24/21</a:t>
             </a:fld>
             <a:endParaRPr lang="en-US" dirty="0"/>
           </a:p>
@@ -2926,7 +3485,7 @@
           <a:p>
             <a:fld id="{F0037C11-A992-43DC-841C-4ED15B44942C}" type="datetimeFigureOut">
               <a:rPr lang="en-US" smtClean="0"/>
-              <a:t>2/24/2021</a:t>
+              <a:t>2/24/21</a:t>
             </a:fld>
             <a:endParaRPr lang="en-US" dirty="0"/>
           </a:p>
@@ -3366,7 +3925,7 @@
         </p:blipFill>
         <p:spPr>
           <a:xfrm>
-            <a:off x="20" y="10"/>
+            <a:off x="-10613" y="10"/>
             <a:ext cx="12191980" cy="6857990"/>
           </a:xfrm>
           <a:prstGeom prst="rect">
@@ -3559,39 +4118,20 @@
           <a:p>
             <a:pPr algn="l"/>
             <a:r>
+              <a:rPr lang="en-US" sz="2000" b="1" dirty="0">
+                <a:solidFill>
+                  <a:schemeClr val="tx2"/>
+                </a:solidFill>
+              </a:rPr>
+              <a:t>Team Members</a:t>
+            </a:r>
+            <a:r>
               <a:rPr lang="en-US" sz="2000" dirty="0">
                 <a:solidFill>
                   <a:schemeClr val="tx2"/>
                 </a:solidFill>
               </a:rPr>
-              <a:t>Team Members: Desiree Diaz, Medina </a:t>
-            </a:r>
-            <a:r>
-              <a:rPr lang="en-US" sz="2000" dirty="0" err="1">
-                <a:solidFill>
-                  <a:schemeClr val="tx2"/>
-                </a:solidFill>
-              </a:rPr>
-              <a:t>Izgutdina</a:t>
-            </a:r>
-            <a:r>
-              <a:rPr lang="en-US" sz="2000" dirty="0">
-                <a:solidFill>
-                  <a:schemeClr val="tx2"/>
-                </a:solidFill>
-              </a:rPr>
-              <a:t>,</a:t>
-            </a:r>
-          </a:p>
-          <a:p>
-            <a:pPr algn="l"/>
-            <a:r>
-              <a:rPr lang="en-US" sz="2000" dirty="0">
-                <a:solidFill>
-                  <a:schemeClr val="tx2"/>
-                </a:solidFill>
-              </a:rPr>
-              <a:t> Irene Okada, Wei Zhu</a:t>
+              <a:t>: Desiree Diaz, Medina Izgutdina,  Irene Okada, Wei Zhu</a:t>
             </a:r>
           </a:p>
         </p:txBody>
@@ -3904,7 +4444,7 @@
         </p:nvSpPr>
         <p:spPr>
           <a:xfrm>
-            <a:off x="893342" y="2780526"/>
+            <a:off x="893355" y="2780526"/>
             <a:ext cx="4229071" cy="1569660"/>
           </a:xfrm>
           <a:prstGeom prst="rect">
@@ -3974,7 +4514,7 @@
         </p:nvSpPr>
         <p:spPr>
           <a:xfrm>
-            <a:off x="6503841" y="2780526"/>
+            <a:off x="6711220" y="2780526"/>
             <a:ext cx="4974985" cy="1569660"/>
           </a:xfrm>
           <a:prstGeom prst="rect">
@@ -4073,8 +4613,8 @@
           <a:lstStyle/>
           <a:p>
             <a:r>
-              <a:rPr lang="en-US" sz="4000" dirty="0"/>
-              <a:t>The model had an accuracy of .85</a:t>
+              <a:rPr lang="en-US" sz="4000" b="1" dirty="0"/>
+              <a:t>The model has an accuracy of .85</a:t>
             </a:r>
           </a:p>
         </p:txBody>
@@ -4421,7 +4961,6 @@
           </a:bodyPr>
           <a:lstStyle/>
           <a:p>
-            <a:pPr algn="ctr"/>
             <a:r>
               <a:rPr lang="en-US" sz="2800" kern="1200" dirty="0">
                 <a:solidFill>
@@ -4488,8 +5027,8 @@
         </p:nvSpPr>
         <p:spPr>
           <a:xfrm>
-            <a:off x="381740" y="284085"/>
-            <a:ext cx="5140171" cy="369332"/>
+            <a:off x="717422" y="4907769"/>
+            <a:ext cx="2940178" cy="1200329"/>
           </a:xfrm>
           <a:prstGeom prst="rect">
             <a:avLst/>
@@ -4503,8 +5042,28 @@
           <a:lstStyle/>
           <a:p>
             <a:r>
-              <a:rPr lang="en-US" dirty="0"/>
-              <a:t>Creation of loan application based on model</a:t>
+              <a:rPr lang="en-US" sz="2400" dirty="0">
+                <a:solidFill>
+                  <a:schemeClr val="tx2"/>
+                </a:solidFill>
+              </a:rPr>
+              <a:t>Based on the model, </a:t>
+            </a:r>
+            <a:r>
+              <a:rPr lang="en-US" sz="2400" b="1" dirty="0">
+                <a:solidFill>
+                  <a:schemeClr val="tx2"/>
+                </a:solidFill>
+              </a:rPr>
+              <a:t>Loan Application</a:t>
+            </a:r>
+            <a:r>
+              <a:rPr lang="en-US" sz="2400" dirty="0">
+                <a:solidFill>
+                  <a:schemeClr val="tx2"/>
+                </a:solidFill>
+              </a:rPr>
+              <a:t> was designed</a:t>
             </a:r>
           </a:p>
         </p:txBody>
@@ -5073,7 +5632,7 @@
           <a:p>
             <a:pPr algn="ctr"/>
             <a:r>
-              <a:rPr lang="en-US" sz="4000" dirty="0"/>
+              <a:rPr lang="en-US" sz="4000" b="1" dirty="0"/>
               <a:t>Demonstration:</a:t>
             </a:r>
             <a:br>
@@ -7489,20 +8048,12 @@
               <a:buNone/>
             </a:pPr>
             <a:r>
-              <a:rPr lang="en-US" sz="2400" u="sng" dirty="0">
-                <a:solidFill>
-                  <a:schemeClr val="tx2"/>
-                </a:solidFill>
-              </a:rPr>
-              <a:t>Data source </a:t>
-            </a:r>
-            <a:r>
               <a:rPr lang="en-US" sz="2400" dirty="0">
                 <a:solidFill>
                   <a:schemeClr val="tx2"/>
                 </a:solidFill>
               </a:rPr>
-              <a:t>: </a:t>
+              <a:t>Data source: </a:t>
             </a:r>
           </a:p>
           <a:p>
@@ -7557,11 +8108,7 @@
                   <a:schemeClr val="tx2"/>
                 </a:solidFill>
               </a:rPr>
-              <a:t> </a:t>
-            </a:r>
-            <a:r>
-              <a:rPr lang="en-US" sz="2400" dirty="0"/>
-              <a:t>Credit history, Loan amount, Loan term, Applicant salary, Co applicant salary, Resident location type (rural, urban, suburban), #Dependents, Marriage status, Graduate status, Employment status, approval status</a:t>
+              <a:t>Credit history, Loan amount, Loan term, Applicant salary, Co-applicant salary, Resident location type (Rural, Urban, Suburban), Number of Dependents, Marriage status, Graduate status, Employment status, Approval status</a:t>
             </a:r>
           </a:p>
           <a:p>
@@ -7730,7 +8277,7 @@
         </p:blipFill>
         <p:spPr>
           <a:xfrm>
-            <a:off x="568960" y="317022"/>
+            <a:off x="568960" y="194007"/>
             <a:ext cx="5327015" cy="6245703"/>
           </a:xfrm>
         </p:spPr>
@@ -7759,7 +8306,7 @@
         </p:blipFill>
         <p:spPr>
           <a:xfrm>
-            <a:off x="6709741" y="643239"/>
+            <a:off x="6374765" y="193097"/>
             <a:ext cx="5248275" cy="6229928"/>
           </a:xfrm>
           <a:prstGeom prst="rect">
@@ -7908,24 +8455,6 @@
               </a:rPr>
               <a:t>Income vs Loan amount: 2 incomes more consistent with higher loan</a:t>
             </a:r>
-            <a:br>
-              <a:rPr lang="en-US" sz="2200" kern="1200" dirty="0">
-                <a:solidFill>
-                  <a:schemeClr val="bg1"/>
-                </a:solidFill>
-                <a:latin typeface="+mj-lt"/>
-                <a:ea typeface="+mj-ea"/>
-                <a:cs typeface="+mj-cs"/>
-              </a:rPr>
-            </a:br>
-            <a:endParaRPr lang="en-US" sz="2200" kern="1200" dirty="0">
-              <a:solidFill>
-                <a:schemeClr val="bg1"/>
-              </a:solidFill>
-              <a:latin typeface="+mj-lt"/>
-              <a:ea typeface="+mj-ea"/>
-              <a:cs typeface="+mj-cs"/>
-            </a:endParaRPr>
           </a:p>
         </p:txBody>
       </p:sp>
@@ -8067,6 +8596,81 @@
           </a:prstGeom>
         </p:spPr>
       </p:pic>
+      <p:sp>
+        <p:nvSpPr>
+          <p:cNvPr id="4" name="TextBox 3">
+            <a:hlinkClick r:id="rId4"/>
+            <a:extLst>
+              <a:ext uri="{FF2B5EF4-FFF2-40B4-BE49-F238E27FC236}">
+                <a16:creationId xmlns:a16="http://schemas.microsoft.com/office/drawing/2014/main" id="{141B29ED-2F0F-F24A-854C-7585EEDE1018}"/>
+              </a:ext>
+            </a:extLst>
+          </p:cNvPr>
+          <p:cNvSpPr txBox="1"/>
+          <p:nvPr/>
+        </p:nvSpPr>
+        <p:spPr>
+          <a:xfrm>
+            <a:off x="5609215" y="6365724"/>
+            <a:ext cx="4473153" cy="307777"/>
+          </a:xfrm>
+          <a:prstGeom prst="rect">
+            <a:avLst/>
+          </a:prstGeom>
+          <a:noFill/>
+        </p:spPr>
+        <p:txBody>
+          <a:bodyPr wrap="square">
+            <a:spAutoFit/>
+          </a:bodyPr>
+          <a:lstStyle/>
+          <a:p>
+            <a:r>
+              <a:rPr lang="en-US" sz="1400" b="0" i="0" kern="1200" dirty="0">
+                <a:solidFill>
+                  <a:schemeClr val="tx2"/>
+                </a:solidFill>
+                <a:effectLst/>
+                <a:latin typeface="+mj-lt"/>
+                <a:ea typeface="+mj-ea"/>
+                <a:cs typeface="+mj-cs"/>
+                <a:hlinkClick r:id="rId4"/>
+              </a:rPr>
+              <a:t>https://public.tableau.com/profile/</a:t>
+            </a:r>
+            <a:r>
+              <a:rPr lang="en-US" sz="1400" b="0" i="0" u="none" strike="noStrike" kern="1200" dirty="0">
+                <a:solidFill>
+                  <a:schemeClr val="tx2"/>
+                </a:solidFill>
+                <a:effectLst/>
+                <a:latin typeface="+mj-lt"/>
+                <a:ea typeface="+mj-ea"/>
+                <a:cs typeface="+mj-cs"/>
+                <a:hlinkClick r:id="rId4"/>
+              </a:rPr>
+              <a:t>ireneokada</a:t>
+            </a:r>
+            <a:r>
+              <a:rPr lang="en-US" sz="1400" b="0" i="0" u="none" strike="noStrike" kern="1200" dirty="0">
+                <a:solidFill>
+                  <a:schemeClr val="tx2"/>
+                </a:solidFill>
+                <a:effectLst/>
+                <a:latin typeface="+mj-lt"/>
+                <a:ea typeface="+mj-ea"/>
+                <a:cs typeface="+mj-cs"/>
+              </a:rPr>
+              <a:t> </a:t>
+            </a:r>
+            <a:endParaRPr lang="en-US" sz="1400" dirty="0">
+              <a:solidFill>
+                <a:schemeClr val="tx2"/>
+              </a:solidFill>
+            </a:endParaRPr>
+          </a:p>
+        </p:txBody>
+      </p:sp>
     </p:spTree>
     <p:extLst>
       <p:ext uri="{BB962C8B-B14F-4D97-AF65-F5344CB8AC3E}">
@@ -8320,7 +8924,7 @@
         </p:nvSpPr>
         <p:spPr>
           <a:xfrm>
-            <a:off x="546351" y="2596836"/>
+            <a:off x="505794" y="2596836"/>
             <a:ext cx="4889170" cy="2862322"/>
           </a:xfrm>
           <a:prstGeom prst="rect">
@@ -8339,7 +8943,7 @@
           <a:p>
             <a:r>
               <a:rPr lang="en-US" sz="2000" dirty="0"/>
-              <a:t>Overall:  approval rates were higher for men, those who are married,  suburbanites, graduates and those with a co-applicant </a:t>
+              <a:t>Overall: approval rates were higher for men, those who are married,  suburbanites, graduates and those with a co-applicant </a:t>
             </a:r>
           </a:p>
           <a:p>
@@ -8361,10 +8965,10 @@
       </p:sp>
       <p:sp>
         <p:nvSpPr>
-          <p:cNvPr id="37" name="TextBox 36">
-            <a:extLst>
-              <a:ext uri="{FF2B5EF4-FFF2-40B4-BE49-F238E27FC236}">
-                <a16:creationId xmlns:a16="http://schemas.microsoft.com/office/drawing/2014/main" id="{42262C61-BB00-4BBD-B874-84A537CAF99F}"/>
+          <p:cNvPr id="10" name="TextBox 9">
+            <a:extLst>
+              <a:ext uri="{FF2B5EF4-FFF2-40B4-BE49-F238E27FC236}">
+                <a16:creationId xmlns:a16="http://schemas.microsoft.com/office/drawing/2014/main" id="{A95FE2A4-2326-4245-A00E-DD939689F2AB}"/>
               </a:ext>
             </a:extLst>
           </p:cNvPr>
@@ -8373,8 +8977,8 @@
         </p:nvSpPr>
         <p:spPr>
           <a:xfrm>
-            <a:off x="6797049" y="2596836"/>
-            <a:ext cx="4501596" cy="1631216"/>
+            <a:off x="6797036" y="2598768"/>
+            <a:ext cx="4889170" cy="2862322"/>
           </a:xfrm>
           <a:prstGeom prst="rect">
             <a:avLst/>
@@ -8392,62 +8996,23 @@
           <a:p>
             <a:r>
               <a:rPr lang="en-US" sz="2000" dirty="0"/>
-              <a:t>Overall: average loan amounts seem higher for graduates, those with a co applicant and those with &gt;1 dependent</a:t>
+              <a:t>Overall: average loan amounts seem higher for graduates, those with a co-applicant and those with &gt;1 dependent</a:t>
             </a:r>
           </a:p>
           <a:p>
             <a:endParaRPr lang="en-US" sz="2000" dirty="0"/>
           </a:p>
-        </p:txBody>
-      </p:sp>
-      <p:sp>
-        <p:nvSpPr>
-          <p:cNvPr id="9" name="TextBox 8">
-            <a:hlinkClick r:id="rId2"/>
-            <a:extLst>
-              <a:ext uri="{FF2B5EF4-FFF2-40B4-BE49-F238E27FC236}">
-                <a16:creationId xmlns:a16="http://schemas.microsoft.com/office/drawing/2014/main" id="{0200A289-A7A1-45B5-BFD9-26C3327F5384}"/>
-              </a:ext>
-            </a:extLst>
-          </p:cNvPr>
-          <p:cNvSpPr txBox="1"/>
-          <p:nvPr/>
-        </p:nvSpPr>
-        <p:spPr>
-          <a:xfrm>
-            <a:off x="702529" y="6221728"/>
-            <a:ext cx="6094520" cy="369332"/>
-          </a:xfrm>
-          <a:prstGeom prst="rect">
-            <a:avLst/>
-          </a:prstGeom>
-          <a:noFill/>
-        </p:spPr>
-        <p:txBody>
-          <a:bodyPr wrap="square">
-            <a:spAutoFit/>
-          </a:bodyPr>
-          <a:lstStyle/>
-          <a:p>
-            <a:r>
-              <a:rPr lang="en-US" sz="1800" b="0" i="0" kern="1200" dirty="0">
-                <a:effectLst/>
-                <a:latin typeface="+mj-lt"/>
-                <a:ea typeface="+mj-ea"/>
-                <a:cs typeface="+mj-cs"/>
-              </a:rPr>
-              <a:t>https://public.tableau.com/profile/</a:t>
-            </a:r>
-            <a:r>
-              <a:rPr lang="en-US" sz="1800" b="0" i="0" u="none" strike="noStrike" kern="1200" dirty="0">
-                <a:effectLst/>
-                <a:latin typeface="+mj-lt"/>
-                <a:ea typeface="+mj-ea"/>
-                <a:cs typeface="+mj-cs"/>
-              </a:rPr>
-              <a:t>ireneokada</a:t>
-            </a:r>
-            <a:endParaRPr lang="en-US" dirty="0"/>
+          <a:p>
+            <a:endParaRPr lang="en-US" sz="2000" dirty="0"/>
+          </a:p>
+          <a:p>
+            <a:endParaRPr lang="en-US" sz="2000" dirty="0"/>
+          </a:p>
+          <a:p>
+            <a:endParaRPr lang="en-US" sz="2000" dirty="0"/>
+          </a:p>
+          <a:p>
+            <a:endParaRPr lang="en-US" sz="2000" dirty="0"/>
           </a:p>
         </p:txBody>
       </p:sp>
@@ -8567,7 +9132,7 @@
         </p:nvSpPr>
         <p:spPr>
           <a:xfrm>
-            <a:off x="4850296" y="365126"/>
+            <a:off x="5165984" y="212722"/>
             <a:ext cx="6503502" cy="628788"/>
           </a:xfrm>
         </p:spPr>
@@ -8578,7 +9143,11 @@
           <a:lstStyle/>
           <a:p>
             <a:r>
-              <a:rPr lang="en-US" dirty="0"/>
+              <a:rPr lang="en-US" b="1" dirty="0">
+                <a:solidFill>
+                  <a:schemeClr val="tx2"/>
+                </a:solidFill>
+              </a:rPr>
               <a:t>Explanatory model</a:t>
             </a:r>
           </a:p>
@@ -8990,17 +9559,29 @@
           <a:lstStyle/>
           <a:p>
             <a:r>
-              <a:rPr lang="en-US" sz="1800" dirty="0"/>
-              <a:t>Dependent variable (Y): Loan Approval (Y/N)</a:t>
-            </a:r>
-          </a:p>
-          <a:p>
-            <a:endParaRPr lang="en-US" sz="1800" dirty="0"/>
-          </a:p>
-          <a:p>
-            <a:r>
-              <a:rPr lang="en-US" sz="1800" dirty="0"/>
-              <a:t>Independent/predictor variables:</a:t>
+              <a:rPr lang="en-US" sz="1800" dirty="0">
+                <a:solidFill>
+                  <a:schemeClr val="tx2"/>
+                </a:solidFill>
+              </a:rPr>
+              <a:t>Dependent variable (y): Loan Approval (Y/N)</a:t>
+            </a:r>
+          </a:p>
+          <a:p>
+            <a:endParaRPr lang="en-US" sz="1800" dirty="0">
+              <a:solidFill>
+                <a:schemeClr val="tx2"/>
+              </a:solidFill>
+            </a:endParaRPr>
+          </a:p>
+          <a:p>
+            <a:r>
+              <a:rPr lang="en-US" sz="1800" dirty="0">
+                <a:solidFill>
+                  <a:schemeClr val="tx2"/>
+                </a:solidFill>
+              </a:rPr>
+              <a:t>Independent/predictor variables (X):</a:t>
             </a:r>
           </a:p>
           <a:p>
@@ -9008,7 +9589,11 @@
               <a:buNone/>
             </a:pPr>
             <a:r>
-              <a:rPr lang="en-US" sz="1800" dirty="0"/>
+              <a:rPr lang="en-US" sz="1800" dirty="0">
+                <a:solidFill>
+                  <a:schemeClr val="tx2"/>
+                </a:solidFill>
+              </a:rPr>
               <a:t>	Credit history</a:t>
             </a:r>
           </a:p>
@@ -9017,7 +9602,11 @@
               <a:buNone/>
             </a:pPr>
             <a:r>
-              <a:rPr lang="en-US" sz="1800" dirty="0"/>
+              <a:rPr lang="en-US" sz="1800" dirty="0">
+                <a:solidFill>
+                  <a:schemeClr val="tx2"/>
+                </a:solidFill>
+              </a:rPr>
               <a:t>	Loan amount</a:t>
             </a:r>
           </a:p>
@@ -9026,7 +9615,11 @@
               <a:buNone/>
             </a:pPr>
             <a:r>
-              <a:rPr lang="en-US" sz="1800" dirty="0"/>
+              <a:rPr lang="en-US" sz="1800" dirty="0">
+                <a:solidFill>
+                  <a:schemeClr val="tx2"/>
+                </a:solidFill>
+              </a:rPr>
               <a:t>	Loan term</a:t>
             </a:r>
           </a:p>
@@ -9035,7 +9628,11 @@
               <a:buNone/>
             </a:pPr>
             <a:r>
-              <a:rPr lang="en-US" sz="1800" dirty="0"/>
+              <a:rPr lang="en-US" sz="1800" dirty="0">
+                <a:solidFill>
+                  <a:schemeClr val="tx2"/>
+                </a:solidFill>
+              </a:rPr>
               <a:t>	Applicant salary</a:t>
             </a:r>
           </a:p>
@@ -9044,8 +9641,12 @@
               <a:buNone/>
             </a:pPr>
             <a:r>
-              <a:rPr lang="en-US" sz="1800" dirty="0"/>
-              <a:t>	Co applicant salary</a:t>
+              <a:rPr lang="en-US" sz="1800" dirty="0">
+                <a:solidFill>
+                  <a:schemeClr val="tx2"/>
+                </a:solidFill>
+              </a:rPr>
+              <a:t>	Co-applicant salary</a:t>
             </a:r>
           </a:p>
           <a:p>
@@ -9053,8 +9654,12 @@
               <a:buNone/>
             </a:pPr>
             <a:r>
-              <a:rPr lang="en-US" sz="1800" dirty="0"/>
-              <a:t>	Resident location type (rural, urban, suburban)</a:t>
+              <a:rPr lang="en-US" sz="1800" dirty="0">
+                <a:solidFill>
+                  <a:schemeClr val="tx2"/>
+                </a:solidFill>
+              </a:rPr>
+              <a:t>	Resident location type (Rural, Urban, Suburban)</a:t>
             </a:r>
           </a:p>
           <a:p>
@@ -9062,8 +9667,12 @@
               <a:buNone/>
             </a:pPr>
             <a:r>
-              <a:rPr lang="en-US" sz="1800" dirty="0"/>
-              <a:t>	#Dependents</a:t>
+              <a:rPr lang="en-US" sz="1800" dirty="0">
+                <a:solidFill>
+                  <a:schemeClr val="tx2"/>
+                </a:solidFill>
+              </a:rPr>
+              <a:t>	Number of Dependents</a:t>
             </a:r>
           </a:p>
           <a:p>
@@ -9071,7 +9680,11 @@
               <a:buNone/>
             </a:pPr>
             <a:r>
-              <a:rPr lang="en-US" sz="1800" dirty="0"/>
+              <a:rPr lang="en-US" sz="1800" dirty="0">
+                <a:solidFill>
+                  <a:schemeClr val="tx2"/>
+                </a:solidFill>
+              </a:rPr>
               <a:t>	Marriage status</a:t>
             </a:r>
           </a:p>
@@ -9080,7 +9693,11 @@
               <a:buNone/>
             </a:pPr>
             <a:r>
-              <a:rPr lang="en-US" sz="1800" dirty="0"/>
+              <a:rPr lang="en-US" sz="1800" dirty="0">
+                <a:solidFill>
+                  <a:schemeClr val="tx2"/>
+                </a:solidFill>
+              </a:rPr>
               <a:t>	Graduate or not</a:t>
             </a:r>
           </a:p>
@@ -9089,8 +9706,12 @@
               <a:buNone/>
             </a:pPr>
             <a:r>
-              <a:rPr lang="en-US" sz="1800" dirty="0"/>
-              <a:t>	Employed vs self-employed</a:t>
+              <a:rPr lang="en-US" sz="1800" dirty="0">
+                <a:solidFill>
+                  <a:schemeClr val="tx2"/>
+                </a:solidFill>
+              </a:rPr>
+              <a:t>	Self-employed or not</a:t>
             </a:r>
           </a:p>
           <a:p>
@@ -9722,12 +10343,12 @@
           <a:lstStyle/>
           <a:p>
             <a:r>
-              <a:rPr lang="en-US" sz="4000">
+              <a:rPr lang="en-US" sz="4000" dirty="0">
                 <a:solidFill>
                   <a:srgbClr val="FFFFFF"/>
                 </a:solidFill>
               </a:rPr>
-              <a:t>Model used: Gradient Boosting classifier with pipeline ML workflow</a:t>
+              <a:t>Model: Gradient Boosting Classifier with Pipeline ML workflow</a:t>
             </a:r>
           </a:p>
         </p:txBody>
@@ -9767,7 +10388,17 @@
               <a:rPr lang="en-US" sz="1800" i="0" dirty="0">
                 <a:effectLst/>
               </a:rPr>
-              <a:t>•Model Used: Gradient boosting classifier</a:t>
+              <a:t>•Model Used: Gradient Boosting </a:t>
+            </a:r>
+            <a:r>
+              <a:rPr lang="en-US" sz="1800" dirty="0"/>
+              <a:t>C</a:t>
+            </a:r>
+            <a:r>
+              <a:rPr lang="en-US" sz="1800" i="0" dirty="0">
+                <a:effectLst/>
+              </a:rPr>
+              <a:t>lassifier</a:t>
             </a:r>
             <a:br>
               <a:rPr lang="en-US" sz="1800" dirty="0"/>
@@ -9797,7 +10428,7 @@
               <a:rPr lang="en-US" sz="1800" i="0" dirty="0">
                 <a:effectLst/>
               </a:rPr>
-              <a:t>•This helped with preprocessing our data and transforming categorical data</a:t>
+              <a:t>•This helped with pre-processing of our data and transforming of categorical data</a:t>
             </a:r>
             <a:br>
               <a:rPr lang="en-US" sz="1800" dirty="0"/>
@@ -9815,7 +10446,7 @@
               <a:rPr lang="en-US" sz="1800" i="0" dirty="0">
                 <a:effectLst/>
               </a:rPr>
-              <a:t>•ML model created through the training process</a:t>
+              <a:t>•Created ML model was trained on the existing dataset</a:t>
             </a:r>
             <a:br>
               <a:rPr lang="en-US" sz="1800" dirty="0"/>
@@ -9824,7 +10455,7 @@
               <a:rPr lang="en-US" sz="1800" i="0" dirty="0">
                 <a:effectLst/>
               </a:rPr>
-              <a:t>•The learning algorithm finds patterns in training the data that maps input data to the target (or outcome to be predicted)</a:t>
+              <a:t>•The learning algorithm finds patterns in training data that maps input data to the target (or outcome to be predicted)</a:t>
             </a:r>
             <a:br>
               <a:rPr lang="en-US" sz="1800" dirty="0"/>
@@ -9841,15 +10472,15 @@
       </p:sp>
       <p:pic>
         <p:nvPicPr>
-          <p:cNvPr id="2050" name="Picture 2" descr="Image result for diagram pipeline ml">
-            <a:extLst>
-              <a:ext uri="{FF2B5EF4-FFF2-40B4-BE49-F238E27FC236}">
-                <a16:creationId xmlns:a16="http://schemas.microsoft.com/office/drawing/2014/main" id="{4BBB5768-EC73-405A-9E92-6DB3ECB2740A}"/>
+          <p:cNvPr id="9" name="Content Placeholder 8" descr="Diagram&#10;&#10;Description automatically generated">
+            <a:extLst>
+              <a:ext uri="{FF2B5EF4-FFF2-40B4-BE49-F238E27FC236}">
+                <a16:creationId xmlns:a16="http://schemas.microsoft.com/office/drawing/2014/main" id="{C16FB944-49A1-9B42-968F-F233F95AFE59}"/>
               </a:ext>
             </a:extLst>
           </p:cNvPr>
           <p:cNvPicPr>
-            <a:picLocks noGrp="1" noChangeAspect="1" noChangeArrowheads="1"/>
+            <a:picLocks noGrp="1" noChangeAspect="1"/>
           </p:cNvPicPr>
           <p:nvPr>
             <p:ph sz="half" idx="2"/>
@@ -9857,33 +10488,30 @@
         </p:nvPicPr>
         <p:blipFill rotWithShape="1">
           <a:blip r:embed="rId2">
+            <a:clrChange>
+              <a:clrFrom>
+                <a:srgbClr val="D8D9D9"/>
+              </a:clrFrom>
+              <a:clrTo>
+                <a:srgbClr val="D8D9D9">
+                  <a:alpha val="0"/>
+                </a:srgbClr>
+              </a:clrTo>
+            </a:clrChange>
             <a:extLst>
               <a:ext uri="{28A0092B-C50C-407E-A947-70E740481C1C}">
                 <a14:useLocalDpi xmlns:a14="http://schemas.microsoft.com/office/drawing/2010/main" val="0"/>
               </a:ext>
             </a:extLst>
           </a:blip>
-          <a:srcRect t="5176"/>
+          <a:srcRect t="8173"/>
           <a:stretch/>
         </p:blipFill>
-        <p:spPr bwMode="auto">
+        <p:spPr>
           <a:xfrm>
-            <a:off x="6098892" y="2492376"/>
-            <a:ext cx="4802404" cy="3563372"/>
+            <a:off x="6172200" y="2209457"/>
+            <a:ext cx="5181600" cy="3722504"/>
           </a:xfrm>
-          <a:prstGeom prst="rect">
-            <a:avLst/>
-          </a:prstGeom>
-          <a:noFill/>
-          <a:extLst>
-            <a:ext uri="{909E8E84-426E-40DD-AFC4-6F175D3DCCD1}">
-              <a14:hiddenFill xmlns:a14="http://schemas.microsoft.com/office/drawing/2010/main">
-                <a:solidFill>
-                  <a:srgbClr val="FFFFFF"/>
-                </a:solidFill>
-              </a14:hiddenFill>
-            </a:ext>
-          </a:extLst>
         </p:spPr>
       </p:pic>
     </p:spTree>
@@ -10024,7 +10652,7 @@
                   <a:srgbClr val="FFFFFF"/>
                 </a:solidFill>
               </a:rPr>
-              <a:t>Featured factors in loan approval are credit history,  loan amount, applicant and co-applicant income. When credit history is removed importance expands to suburban location and  those with 2-3 dependents</a:t>
+              <a:t>Featured factors in loan approval are Credit History, Loan Amount, Applicant and Co-applicant Income. When Credit History is removed importance expands to Suburban location and those with 2-3 Dependents</a:t>
             </a:r>
           </a:p>
         </p:txBody>
@@ -10081,44 +10709,6 @@
           </a:fontRef>
         </p:style>
       </p:cxnSp>
-      <p:pic>
-        <p:nvPicPr>
-          <p:cNvPr id="12" name="Content Placeholder 11" descr="Chart, bar chart&#10;&#10;Description automatically generated">
-            <a:extLst>
-              <a:ext uri="{FF2B5EF4-FFF2-40B4-BE49-F238E27FC236}">
-                <a16:creationId xmlns:a16="http://schemas.microsoft.com/office/drawing/2014/main" id="{95D31784-AB94-4AE8-AB35-4B71D60F1999}"/>
-              </a:ext>
-            </a:extLst>
-          </p:cNvPr>
-          <p:cNvPicPr>
-            <a:picLocks noGrp="1" noChangeAspect="1"/>
-          </p:cNvPicPr>
-          <p:nvPr>
-            <p:ph sz="half" idx="2"/>
-          </p:nvPr>
-        </p:nvPicPr>
-        <p:blipFill>
-          <a:blip r:embed="rId2">
-            <a:extLst>
-              <a:ext uri="{28A0092B-C50C-407E-A947-70E740481C1C}">
-                <a14:useLocalDpi xmlns:a14="http://schemas.microsoft.com/office/drawing/2010/main" val="0"/>
-              </a:ext>
-            </a:extLst>
-          </a:blip>
-          <a:stretch>
-            <a:fillRect/>
-          </a:stretch>
-        </p:blipFill>
-        <p:spPr>
-          <a:xfrm>
-            <a:off x="748752" y="2426818"/>
-            <a:ext cx="4621546" cy="3997637"/>
-          </a:xfrm>
-          <a:prstGeom prst="rect">
-            <a:avLst/>
-          </a:prstGeom>
-        </p:spPr>
-      </p:pic>
       <p:cxnSp>
         <p:nvCxnSpPr>
           <p:cNvPr id="21" name="Straight Connector 20">
@@ -10173,19 +10763,17 @@
       </p:cxnSp>
       <p:pic>
         <p:nvPicPr>
-          <p:cNvPr id="6" name="Content Placeholder 5" descr="Graphical user interface&#10;&#10;Description automatically generated with low confidence">
-            <a:extLst>
-              <a:ext uri="{FF2B5EF4-FFF2-40B4-BE49-F238E27FC236}">
-                <a16:creationId xmlns:a16="http://schemas.microsoft.com/office/drawing/2014/main" id="{F343D4C4-8663-47E8-B673-E288593D5E92}"/>
+          <p:cNvPr id="20" name="Picture 19">
+            <a:extLst>
+              <a:ext uri="{FF2B5EF4-FFF2-40B4-BE49-F238E27FC236}">
+                <a16:creationId xmlns:a16="http://schemas.microsoft.com/office/drawing/2014/main" id="{2072415A-65B3-7F4B-B9C9-52EB5260CFF7}"/>
               </a:ext>
             </a:extLst>
           </p:cNvPr>
           <p:cNvPicPr>
-            <a:picLocks noGrp="1" noChangeAspect="1"/>
+            <a:picLocks noChangeAspect="1"/>
           </p:cNvPicPr>
-          <p:nvPr>
-            <p:ph sz="half" idx="1"/>
-          </p:nvPr>
+          <p:nvPr/>
         </p:nvPicPr>
         <p:blipFill>
           <a:blip r:embed="rId3">
@@ -10201,14 +10789,110 @@
         </p:blipFill>
         <p:spPr>
           <a:xfrm>
-            <a:off x="6445073" y="2897980"/>
-            <a:ext cx="5455917" cy="3055313"/>
+            <a:off x="6589746" y="2184132"/>
+            <a:ext cx="4874618" cy="4728313"/>
           </a:xfrm>
           <a:prstGeom prst="rect">
             <a:avLst/>
           </a:prstGeom>
         </p:spPr>
       </p:pic>
+      <p:grpSp>
+        <p:nvGrpSpPr>
+          <p:cNvPr id="23" name="Group 22">
+            <a:extLst>
+              <a:ext uri="{FF2B5EF4-FFF2-40B4-BE49-F238E27FC236}">
+                <a16:creationId xmlns:a16="http://schemas.microsoft.com/office/drawing/2014/main" id="{AB7141BF-ABB9-5345-9DEE-3BE9F4D4626E}"/>
+              </a:ext>
+            </a:extLst>
+          </p:cNvPr>
+          <p:cNvGrpSpPr/>
+          <p:nvPr/>
+        </p:nvGrpSpPr>
+        <p:grpSpPr>
+          <a:xfrm>
+            <a:off x="874530" y="2184790"/>
+            <a:ext cx="4744217" cy="4678870"/>
+            <a:chOff x="874530" y="2184790"/>
+            <a:chExt cx="4744217" cy="4678870"/>
+          </a:xfrm>
+        </p:grpSpPr>
+        <p:pic>
+          <p:nvPicPr>
+            <p:cNvPr id="15" name="Picture 14">
+              <a:extLst>
+                <a:ext uri="{FF2B5EF4-FFF2-40B4-BE49-F238E27FC236}">
+                  <a16:creationId xmlns:a16="http://schemas.microsoft.com/office/drawing/2014/main" id="{8B9323F5-273F-A140-8068-97EB48AC55A6}"/>
+                </a:ext>
+              </a:extLst>
+            </p:cNvPr>
+            <p:cNvPicPr>
+              <a:picLocks noChangeAspect="1"/>
+            </p:cNvPicPr>
+            <p:nvPr/>
+          </p:nvPicPr>
+          <p:blipFill>
+            <a:blip r:embed="rId4">
+              <a:extLst>
+                <a:ext uri="{28A0092B-C50C-407E-A947-70E740481C1C}">
+                  <a14:useLocalDpi xmlns:a14="http://schemas.microsoft.com/office/drawing/2010/main" val="0"/>
+                </a:ext>
+              </a:extLst>
+            </a:blip>
+            <a:stretch>
+              <a:fillRect/>
+            </a:stretch>
+          </p:blipFill>
+          <p:spPr>
+            <a:xfrm>
+              <a:off x="874530" y="2184790"/>
+              <a:ext cx="4744217" cy="4678870"/>
+            </a:xfrm>
+            <a:prstGeom prst="rect">
+              <a:avLst/>
+            </a:prstGeom>
+          </p:spPr>
+        </p:pic>
+        <p:sp>
+          <p:nvSpPr>
+            <p:cNvPr id="22" name="TextBox 21">
+              <a:extLst>
+                <a:ext uri="{FF2B5EF4-FFF2-40B4-BE49-F238E27FC236}">
+                  <a16:creationId xmlns:a16="http://schemas.microsoft.com/office/drawing/2014/main" id="{B7176D66-F260-AD40-8236-5DE18415FA6B}"/>
+                </a:ext>
+              </a:extLst>
+            </p:cNvPr>
+            <p:cNvSpPr txBox="1"/>
+            <p:nvPr/>
+          </p:nvSpPr>
+          <p:spPr>
+            <a:xfrm>
+              <a:off x="1684421" y="2489114"/>
+              <a:ext cx="269625" cy="215444"/>
+            </a:xfrm>
+            <a:prstGeom prst="rect">
+              <a:avLst/>
+            </a:prstGeom>
+            <a:noFill/>
+          </p:spPr>
+          <p:txBody>
+            <a:bodyPr wrap="square" rtlCol="0">
+              <a:spAutoFit/>
+            </a:bodyPr>
+            <a:lstStyle/>
+            <a:p>
+              <a:r>
+                <a:rPr lang="en-US" sz="800" dirty="0">
+                  <a:solidFill>
+                    <a:schemeClr val="accent1"/>
+                  </a:solidFill>
+                </a:rPr>
+                <a:t>✱</a:t>
+              </a:r>
+            </a:p>
+          </p:txBody>
+        </p:sp>
+      </p:grpSp>
     </p:spTree>
     <p:extLst>
       <p:ext uri="{BB962C8B-B14F-4D97-AF65-F5344CB8AC3E}">
@@ -10515,4 +11199,299 @@
     </a:ext>
   </a:extLst>
 </a:theme>
+</file>
+
+<file path=ppt/theme/theme2.xml><?xml version="1.0" encoding="utf-8"?>
+<a:theme xmlns:a="http://schemas.openxmlformats.org/drawingml/2006/main" name="Office Theme">
+  <a:themeElements>
+    <a:clrScheme name="Office">
+      <a:dk1>
+        <a:sysClr val="windowText" lastClr="000000"/>
+      </a:dk1>
+      <a:lt1>
+        <a:sysClr val="window" lastClr="FFFFFF"/>
+      </a:lt1>
+      <a:dk2>
+        <a:srgbClr val="44546A"/>
+      </a:dk2>
+      <a:lt2>
+        <a:srgbClr val="E7E6E6"/>
+      </a:lt2>
+      <a:accent1>
+        <a:srgbClr val="4472C4"/>
+      </a:accent1>
+      <a:accent2>
+        <a:srgbClr val="ED7D31"/>
+      </a:accent2>
+      <a:accent3>
+        <a:srgbClr val="A5A5A5"/>
+      </a:accent3>
+      <a:accent4>
+        <a:srgbClr val="FFC000"/>
+      </a:accent4>
+      <a:accent5>
+        <a:srgbClr val="5B9BD5"/>
+      </a:accent5>
+      <a:accent6>
+        <a:srgbClr val="70AD47"/>
+      </a:accent6>
+      <a:hlink>
+        <a:srgbClr val="0563C1"/>
+      </a:hlink>
+      <a:folHlink>
+        <a:srgbClr val="954F72"/>
+      </a:folHlink>
+    </a:clrScheme>
+    <a:fontScheme name="Office">
+      <a:majorFont>
+        <a:latin typeface="Calibri Light" panose="020F0302020204030204"/>
+        <a:ea typeface=""/>
+        <a:cs typeface=""/>
+        <a:font script="Jpan" typeface="游ゴシック Light"/>
+        <a:font script="Hang" typeface="맑은 고딕"/>
+        <a:font script="Hans" typeface="等线 Light"/>
+        <a:font script="Hant" typeface="新細明體"/>
+        <a:font script="Arab" typeface="Times New Roman"/>
+        <a:font script="Hebr" typeface="Times New Roman"/>
+        <a:font script="Thai" typeface="Angsana New"/>
+        <a:font script="Ethi" typeface="Nyala"/>
+        <a:font script="Beng" typeface="Vrinda"/>
+        <a:font script="Gujr" typeface="Shruti"/>
+        <a:font script="Khmr" typeface="MoolBoran"/>
+        <a:font script="Knda" typeface="Tunga"/>
+        <a:font script="Guru" typeface="Raavi"/>
+        <a:font script="Cans" typeface="Euphemia"/>
+        <a:font script="Cher" typeface="Plantagenet Cherokee"/>
+        <a:font script="Yiii" typeface="Microsoft Yi Baiti"/>
+        <a:font script="Tibt" typeface="Microsoft Himalaya"/>
+        <a:font script="Thaa" typeface="MV Boli"/>
+        <a:font script="Deva" typeface="Mangal"/>
+        <a:font script="Telu" typeface="Gautami"/>
+        <a:font script="Taml" typeface="Latha"/>
+        <a:font script="Syrc" typeface="Estrangelo Edessa"/>
+        <a:font script="Orya" typeface="Kalinga"/>
+        <a:font script="Mlym" typeface="Kartika"/>
+        <a:font script="Laoo" typeface="DokChampa"/>
+        <a:font script="Sinh" typeface="Iskoola Pota"/>
+        <a:font script="Mong" typeface="Mongolian Baiti"/>
+        <a:font script="Viet" typeface="Times New Roman"/>
+        <a:font script="Uigh" typeface="Microsoft Uighur"/>
+        <a:font script="Geor" typeface="Sylfaen"/>
+        <a:font script="Armn" typeface="Arial"/>
+        <a:font script="Bugi" typeface="Leelawadee UI"/>
+        <a:font script="Bopo" typeface="Microsoft JhengHei"/>
+        <a:font script="Java" typeface="Javanese Text"/>
+        <a:font script="Lisu" typeface="Segoe UI"/>
+        <a:font script="Mymr" typeface="Myanmar Text"/>
+        <a:font script="Nkoo" typeface="Ebrima"/>
+        <a:font script="Olck" typeface="Nirmala UI"/>
+        <a:font script="Osma" typeface="Ebrima"/>
+        <a:font script="Phag" typeface="Phagspa"/>
+        <a:font script="Syrn" typeface="Estrangelo Edessa"/>
+        <a:font script="Syrj" typeface="Estrangelo Edessa"/>
+        <a:font script="Syre" typeface="Estrangelo Edessa"/>
+        <a:font script="Sora" typeface="Nirmala UI"/>
+        <a:font script="Tale" typeface="Microsoft Tai Le"/>
+        <a:font script="Talu" typeface="Microsoft New Tai Lue"/>
+        <a:font script="Tfng" typeface="Ebrima"/>
+      </a:majorFont>
+      <a:minorFont>
+        <a:latin typeface="Calibri" panose="020F0502020204030204"/>
+        <a:ea typeface=""/>
+        <a:cs typeface=""/>
+        <a:font script="Jpan" typeface="游ゴシック"/>
+        <a:font script="Hang" typeface="맑은 고딕"/>
+        <a:font script="Hans" typeface="等线"/>
+        <a:font script="Hant" typeface="新細明體"/>
+        <a:font script="Arab" typeface="Arial"/>
+        <a:font script="Hebr" typeface="Arial"/>
+        <a:font script="Thai" typeface="Cordia New"/>
+        <a:font script="Ethi" typeface="Nyala"/>
+        <a:font script="Beng" typeface="Vrinda"/>
+        <a:font script="Gujr" typeface="Shruti"/>
+        <a:font script="Khmr" typeface="DaunPenh"/>
+        <a:font script="Knda" typeface="Tunga"/>
+        <a:font script="Guru" typeface="Raavi"/>
+        <a:font script="Cans" typeface="Euphemia"/>
+        <a:font script="Cher" typeface="Plantagenet Cherokee"/>
+        <a:font script="Yiii" typeface="Microsoft Yi Baiti"/>
+        <a:font script="Tibt" typeface="Microsoft Himalaya"/>
+        <a:font script="Thaa" typeface="MV Boli"/>
+        <a:font script="Deva" typeface="Mangal"/>
+        <a:font script="Telu" typeface="Gautami"/>
+        <a:font script="Taml" typeface="Latha"/>
+        <a:font script="Syrc" typeface="Estrangelo Edessa"/>
+        <a:font script="Orya" typeface="Kalinga"/>
+        <a:font script="Mlym" typeface="Kartika"/>
+        <a:font script="Laoo" typeface="DokChampa"/>
+        <a:font script="Sinh" typeface="Iskoola Pota"/>
+        <a:font script="Mong" typeface="Mongolian Baiti"/>
+        <a:font script="Viet" typeface="Arial"/>
+        <a:font script="Uigh" typeface="Microsoft Uighur"/>
+        <a:font script="Geor" typeface="Sylfaen"/>
+        <a:font script="Armn" typeface="Arial"/>
+        <a:font script="Bugi" typeface="Leelawadee UI"/>
+        <a:font script="Bopo" typeface="Microsoft JhengHei"/>
+        <a:font script="Java" typeface="Javanese Text"/>
+        <a:font script="Lisu" typeface="Segoe UI"/>
+        <a:font script="Mymr" typeface="Myanmar Text"/>
+        <a:font script="Nkoo" typeface="Ebrima"/>
+        <a:font script="Olck" typeface="Nirmala UI"/>
+        <a:font script="Osma" typeface="Ebrima"/>
+        <a:font script="Phag" typeface="Phagspa"/>
+        <a:font script="Syrn" typeface="Estrangelo Edessa"/>
+        <a:font script="Syrj" typeface="Estrangelo Edessa"/>
+        <a:font script="Syre" typeface="Estrangelo Edessa"/>
+        <a:font script="Sora" typeface="Nirmala UI"/>
+        <a:font script="Tale" typeface="Microsoft Tai Le"/>
+        <a:font script="Talu" typeface="Microsoft New Tai Lue"/>
+        <a:font script="Tfng" typeface="Ebrima"/>
+      </a:minorFont>
+    </a:fontScheme>
+    <a:fmtScheme name="Office">
+      <a:fillStyleLst>
+        <a:solidFill>
+          <a:schemeClr val="phClr"/>
+        </a:solidFill>
+        <a:gradFill rotWithShape="1">
+          <a:gsLst>
+            <a:gs pos="0">
+              <a:schemeClr val="phClr">
+                <a:lumMod val="110000"/>
+                <a:satMod val="105000"/>
+                <a:tint val="67000"/>
+              </a:schemeClr>
+            </a:gs>
+            <a:gs pos="50000">
+              <a:schemeClr val="phClr">
+                <a:lumMod val="105000"/>
+                <a:satMod val="103000"/>
+                <a:tint val="73000"/>
+              </a:schemeClr>
+            </a:gs>
+            <a:gs pos="100000">
+              <a:schemeClr val="phClr">
+                <a:lumMod val="105000"/>
+                <a:satMod val="109000"/>
+                <a:tint val="81000"/>
+              </a:schemeClr>
+            </a:gs>
+          </a:gsLst>
+          <a:lin ang="5400000" scaled="0"/>
+        </a:gradFill>
+        <a:gradFill rotWithShape="1">
+          <a:gsLst>
+            <a:gs pos="0">
+              <a:schemeClr val="phClr">
+                <a:satMod val="103000"/>
+                <a:lumMod val="102000"/>
+                <a:tint val="94000"/>
+              </a:schemeClr>
+            </a:gs>
+            <a:gs pos="50000">
+              <a:schemeClr val="phClr">
+                <a:satMod val="110000"/>
+                <a:lumMod val="100000"/>
+                <a:shade val="100000"/>
+              </a:schemeClr>
+            </a:gs>
+            <a:gs pos="100000">
+              <a:schemeClr val="phClr">
+                <a:lumMod val="99000"/>
+                <a:satMod val="120000"/>
+                <a:shade val="78000"/>
+              </a:schemeClr>
+            </a:gs>
+          </a:gsLst>
+          <a:lin ang="5400000" scaled="0"/>
+        </a:gradFill>
+      </a:fillStyleLst>
+      <a:lnStyleLst>
+        <a:ln w="6350" cap="flat" cmpd="sng" algn="ctr">
+          <a:solidFill>
+            <a:schemeClr val="phClr"/>
+          </a:solidFill>
+          <a:prstDash val="solid"/>
+          <a:miter lim="800000"/>
+        </a:ln>
+        <a:ln w="12700" cap="flat" cmpd="sng" algn="ctr">
+          <a:solidFill>
+            <a:schemeClr val="phClr"/>
+          </a:solidFill>
+          <a:prstDash val="solid"/>
+          <a:miter lim="800000"/>
+        </a:ln>
+        <a:ln w="19050" cap="flat" cmpd="sng" algn="ctr">
+          <a:solidFill>
+            <a:schemeClr val="phClr"/>
+          </a:solidFill>
+          <a:prstDash val="solid"/>
+          <a:miter lim="800000"/>
+        </a:ln>
+      </a:lnStyleLst>
+      <a:effectStyleLst>
+        <a:effectStyle>
+          <a:effectLst/>
+        </a:effectStyle>
+        <a:effectStyle>
+          <a:effectLst/>
+        </a:effectStyle>
+        <a:effectStyle>
+          <a:effectLst>
+            <a:outerShdw blurRad="57150" dist="19050" dir="5400000" algn="ctr" rotWithShape="0">
+              <a:srgbClr val="000000">
+                <a:alpha val="63000"/>
+              </a:srgbClr>
+            </a:outerShdw>
+          </a:effectLst>
+        </a:effectStyle>
+      </a:effectStyleLst>
+      <a:bgFillStyleLst>
+        <a:solidFill>
+          <a:schemeClr val="phClr"/>
+        </a:solidFill>
+        <a:solidFill>
+          <a:schemeClr val="phClr">
+            <a:tint val="95000"/>
+            <a:satMod val="170000"/>
+          </a:schemeClr>
+        </a:solidFill>
+        <a:gradFill rotWithShape="1">
+          <a:gsLst>
+            <a:gs pos="0">
+              <a:schemeClr val="phClr">
+                <a:tint val="93000"/>
+                <a:satMod val="150000"/>
+                <a:shade val="98000"/>
+                <a:lumMod val="102000"/>
+              </a:schemeClr>
+            </a:gs>
+            <a:gs pos="50000">
+              <a:schemeClr val="phClr">
+                <a:tint val="98000"/>
+                <a:satMod val="130000"/>
+                <a:shade val="90000"/>
+                <a:lumMod val="103000"/>
+              </a:schemeClr>
+            </a:gs>
+            <a:gs pos="100000">
+              <a:schemeClr val="phClr">
+                <a:shade val="63000"/>
+                <a:satMod val="120000"/>
+              </a:schemeClr>
+            </a:gs>
+          </a:gsLst>
+          <a:lin ang="5400000" scaled="0"/>
+        </a:gradFill>
+      </a:bgFillStyleLst>
+    </a:fmtScheme>
+  </a:themeElements>
+  <a:objectDefaults/>
+  <a:extraClrSchemeLst/>
+  <a:extLst>
+    <a:ext uri="{05A4C25C-085E-4340-85A3-A5531E510DB2}">
+      <thm15:themeFamily xmlns:thm15="http://schemas.microsoft.com/office/thememl/2012/main" name="Office Theme" id="{62F939B6-93AF-4DB8-9C6B-D6C7DFDC589F}" vid="{4A3C46E8-61CC-4603-A589-7422A47A8E4A}"/>
+    </a:ext>
+  </a:extLst>
+</a:theme>
 </file>
</xml_diff>